<commit_message>
Pazymejau tiksla bug0 algoritmo aiskinime
</commit_message>
<xml_diff>
--- a/Pristatymas.pptx
+++ b/Pristatymas.pptx
@@ -287,7 +287,7 @@
           <a:p>
             <a:fld id="{1831D992-056E-4E26-8BD5-C03F2D2DE219}" type="datetimeFigureOut">
               <a:rPr lang="en-US" smtClean="0"/>
-              <a:t>2020-12-09</a:t>
+              <a:t>12/09/2020</a:t>
             </a:fld>
             <a:endParaRPr lang="en-US"/>
           </a:p>
@@ -617,7 +617,7 @@
           <a:p>
             <a:fld id="{1831D992-056E-4E26-8BD5-C03F2D2DE219}" type="datetimeFigureOut">
               <a:rPr lang="en-US" smtClean="0"/>
-              <a:t>2020-12-09</a:t>
+              <a:t>12/09/2020</a:t>
             </a:fld>
             <a:endParaRPr lang="en-US"/>
           </a:p>
@@ -797,7 +797,7 @@
           <a:p>
             <a:fld id="{1831D992-056E-4E26-8BD5-C03F2D2DE219}" type="datetimeFigureOut">
               <a:rPr lang="en-US" smtClean="0"/>
-              <a:t>2020-12-09</a:t>
+              <a:t>12/09/2020</a:t>
             </a:fld>
             <a:endParaRPr lang="en-US"/>
           </a:p>
@@ -967,7 +967,7 @@
           <a:p>
             <a:fld id="{1831D992-056E-4E26-8BD5-C03F2D2DE219}" type="datetimeFigureOut">
               <a:rPr lang="en-US" smtClean="0"/>
-              <a:t>2020-12-09</a:t>
+              <a:t>12/09/2020</a:t>
             </a:fld>
             <a:endParaRPr lang="en-US"/>
           </a:p>
@@ -1244,7 +1244,7 @@
           <a:p>
             <a:fld id="{1831D992-056E-4E26-8BD5-C03F2D2DE219}" type="datetimeFigureOut">
               <a:rPr lang="en-US" smtClean="0"/>
-              <a:t>2020-12-09</a:t>
+              <a:t>12/09/2020</a:t>
             </a:fld>
             <a:endParaRPr lang="en-US"/>
           </a:p>
@@ -1638,7 +1638,7 @@
           <a:p>
             <a:fld id="{1831D992-056E-4E26-8BD5-C03F2D2DE219}" type="datetimeFigureOut">
               <a:rPr lang="en-US" smtClean="0"/>
-              <a:t>2020-12-09</a:t>
+              <a:t>12/09/2020</a:t>
             </a:fld>
             <a:endParaRPr lang="en-US"/>
           </a:p>
@@ -2115,7 +2115,7 @@
           <a:p>
             <a:fld id="{1831D992-056E-4E26-8BD5-C03F2D2DE219}" type="datetimeFigureOut">
               <a:rPr lang="en-US" smtClean="0"/>
-              <a:t>2020-12-09</a:t>
+              <a:t>12/09/2020</a:t>
             </a:fld>
             <a:endParaRPr lang="en-US"/>
           </a:p>
@@ -2233,7 +2233,7 @@
           <a:p>
             <a:fld id="{1831D992-056E-4E26-8BD5-C03F2D2DE219}" type="datetimeFigureOut">
               <a:rPr lang="en-US" smtClean="0"/>
-              <a:t>2020-12-09</a:t>
+              <a:t>12/09/2020</a:t>
             </a:fld>
             <a:endParaRPr lang="en-US"/>
           </a:p>
@@ -2328,7 +2328,7 @@
           <a:p>
             <a:fld id="{1831D992-056E-4E26-8BD5-C03F2D2DE219}" type="datetimeFigureOut">
               <a:rPr lang="en-US" smtClean="0"/>
-              <a:t>2020-12-09</a:t>
+              <a:t>12/09/2020</a:t>
             </a:fld>
             <a:endParaRPr lang="en-US"/>
           </a:p>
@@ -2674,7 +2674,7 @@
           <a:p>
             <a:fld id="{1831D992-056E-4E26-8BD5-C03F2D2DE219}" type="datetimeFigureOut">
               <a:rPr lang="en-US" smtClean="0"/>
-              <a:t>2020-12-09</a:t>
+              <a:t>12/09/2020</a:t>
             </a:fld>
             <a:endParaRPr lang="en-US"/>
           </a:p>
@@ -3062,7 +3062,7 @@
           <a:p>
             <a:fld id="{1831D992-056E-4E26-8BD5-C03F2D2DE219}" type="datetimeFigureOut">
               <a:rPr lang="en-US" smtClean="0"/>
-              <a:t>2020-12-09</a:t>
+              <a:t>12/09/2020</a:t>
             </a:fld>
             <a:endParaRPr lang="en-US"/>
           </a:p>
@@ -3340,7 +3340,7 @@
           <a:p>
             <a:fld id="{1831D992-056E-4E26-8BD5-C03F2D2DE219}" type="datetimeFigureOut">
               <a:rPr lang="en-US" smtClean="0"/>
-              <a:t>2020-12-09</a:t>
+              <a:t>12/09/2020</a:t>
             </a:fld>
             <a:endParaRPr lang="en-US"/>
           </a:p>
@@ -4401,6 +4401,58 @@
           </a:prstGeom>
         </p:spPr>
       </p:pic>
+      <p:sp>
+        <p:nvSpPr>
+          <p:cNvPr id="6" name="Oval 5">
+            <a:extLst>
+              <a:ext uri="{FF2B5EF4-FFF2-40B4-BE49-F238E27FC236}">
+                <a16:creationId xmlns:a16="http://schemas.microsoft.com/office/drawing/2014/main" id="{B093F24E-8BC1-4D9F-950E-CC7D54CE682C}"/>
+              </a:ext>
+            </a:extLst>
+          </p:cNvPr>
+          <p:cNvSpPr/>
+          <p:nvPr/>
+        </p:nvSpPr>
+        <p:spPr>
+          <a:xfrm>
+            <a:off x="9130282" y="1648414"/>
+            <a:ext cx="159492" cy="167134"/>
+          </a:xfrm>
+          <a:prstGeom prst="ellipse">
+            <a:avLst/>
+          </a:prstGeom>
+          <a:noFill/>
+          <a:ln>
+            <a:solidFill>
+              <a:srgbClr val="FF0000"/>
+            </a:solidFill>
+          </a:ln>
+        </p:spPr>
+        <p:style>
+          <a:lnRef idx="2">
+            <a:schemeClr val="accent1">
+              <a:shade val="50000"/>
+            </a:schemeClr>
+          </a:lnRef>
+          <a:fillRef idx="1">
+            <a:schemeClr val="accent1"/>
+          </a:fillRef>
+          <a:effectRef idx="0">
+            <a:schemeClr val="accent1"/>
+          </a:effectRef>
+          <a:fontRef idx="minor">
+            <a:schemeClr val="lt1"/>
+          </a:fontRef>
+        </p:style>
+        <p:txBody>
+          <a:bodyPr rtlCol="0" anchor="ctr"/>
+          <a:lstStyle/>
+          <a:p>
+            <a:pPr algn="ctr"/>
+            <a:endParaRPr lang="en-US"/>
+          </a:p>
+        </p:txBody>
+      </p:sp>
     </p:spTree>
     <p:extLst>
       <p:ext uri="{BB962C8B-B14F-4D97-AF65-F5344CB8AC3E}">

</xml_diff>

<commit_message>
Pristatymo skaidrės ir konvertuotas į pdf failas
</commit_message>
<xml_diff>
--- a/Pristatymas.pptx
+++ b/Pristatymas.pptx
@@ -287,7 +287,7 @@
           <a:p>
             <a:fld id="{1831D992-056E-4E26-8BD5-C03F2D2DE219}" type="datetimeFigureOut">
               <a:rPr lang="en-US" smtClean="0"/>
-              <a:t>2020-12-10</a:t>
+              <a:t>12/10/2020</a:t>
             </a:fld>
             <a:endParaRPr lang="en-US"/>
           </a:p>
@@ -617,7 +617,7 @@
           <a:p>
             <a:fld id="{1831D992-056E-4E26-8BD5-C03F2D2DE219}" type="datetimeFigureOut">
               <a:rPr lang="en-US" smtClean="0"/>
-              <a:t>2020-12-10</a:t>
+              <a:t>12/10/2020</a:t>
             </a:fld>
             <a:endParaRPr lang="en-US"/>
           </a:p>
@@ -797,7 +797,7 @@
           <a:p>
             <a:fld id="{1831D992-056E-4E26-8BD5-C03F2D2DE219}" type="datetimeFigureOut">
               <a:rPr lang="en-US" smtClean="0"/>
-              <a:t>2020-12-10</a:t>
+              <a:t>12/10/2020</a:t>
             </a:fld>
             <a:endParaRPr lang="en-US"/>
           </a:p>
@@ -967,7 +967,7 @@
           <a:p>
             <a:fld id="{1831D992-056E-4E26-8BD5-C03F2D2DE219}" type="datetimeFigureOut">
               <a:rPr lang="en-US" smtClean="0"/>
-              <a:t>2020-12-10</a:t>
+              <a:t>12/10/2020</a:t>
             </a:fld>
             <a:endParaRPr lang="en-US"/>
           </a:p>
@@ -1244,7 +1244,7 @@
           <a:p>
             <a:fld id="{1831D992-056E-4E26-8BD5-C03F2D2DE219}" type="datetimeFigureOut">
               <a:rPr lang="en-US" smtClean="0"/>
-              <a:t>2020-12-10</a:t>
+              <a:t>12/10/2020</a:t>
             </a:fld>
             <a:endParaRPr lang="en-US"/>
           </a:p>
@@ -1638,7 +1638,7 @@
           <a:p>
             <a:fld id="{1831D992-056E-4E26-8BD5-C03F2D2DE219}" type="datetimeFigureOut">
               <a:rPr lang="en-US" smtClean="0"/>
-              <a:t>2020-12-10</a:t>
+              <a:t>12/10/2020</a:t>
             </a:fld>
             <a:endParaRPr lang="en-US"/>
           </a:p>
@@ -2115,7 +2115,7 @@
           <a:p>
             <a:fld id="{1831D992-056E-4E26-8BD5-C03F2D2DE219}" type="datetimeFigureOut">
               <a:rPr lang="en-US" smtClean="0"/>
-              <a:t>2020-12-10</a:t>
+              <a:t>12/10/2020</a:t>
             </a:fld>
             <a:endParaRPr lang="en-US"/>
           </a:p>
@@ -2233,7 +2233,7 @@
           <a:p>
             <a:fld id="{1831D992-056E-4E26-8BD5-C03F2D2DE219}" type="datetimeFigureOut">
               <a:rPr lang="en-US" smtClean="0"/>
-              <a:t>2020-12-10</a:t>
+              <a:t>12/10/2020</a:t>
             </a:fld>
             <a:endParaRPr lang="en-US"/>
           </a:p>
@@ -2328,7 +2328,7 @@
           <a:p>
             <a:fld id="{1831D992-056E-4E26-8BD5-C03F2D2DE219}" type="datetimeFigureOut">
               <a:rPr lang="en-US" smtClean="0"/>
-              <a:t>2020-12-10</a:t>
+              <a:t>12/10/2020</a:t>
             </a:fld>
             <a:endParaRPr lang="en-US"/>
           </a:p>
@@ -2674,7 +2674,7 @@
           <a:p>
             <a:fld id="{1831D992-056E-4E26-8BD5-C03F2D2DE219}" type="datetimeFigureOut">
               <a:rPr lang="en-US" smtClean="0"/>
-              <a:t>2020-12-10</a:t>
+              <a:t>12/10/2020</a:t>
             </a:fld>
             <a:endParaRPr lang="en-US"/>
           </a:p>
@@ -3062,7 +3062,7 @@
           <a:p>
             <a:fld id="{1831D992-056E-4E26-8BD5-C03F2D2DE219}" type="datetimeFigureOut">
               <a:rPr lang="en-US" smtClean="0"/>
-              <a:t>2020-12-10</a:t>
+              <a:t>12/10/2020</a:t>
             </a:fld>
             <a:endParaRPr lang="en-US"/>
           </a:p>
@@ -3340,7 +3340,7 @@
           <a:p>
             <a:fld id="{1831D992-056E-4E26-8BD5-C03F2D2DE219}" type="datetimeFigureOut">
               <a:rPr lang="en-US" smtClean="0"/>
-              <a:t>2020-12-10</a:t>
+              <a:t>12/10/2020</a:t>
             </a:fld>
             <a:endParaRPr lang="en-US"/>
           </a:p>
@@ -4619,14 +4619,14 @@
           <a:bodyPr/>
           <a:lstStyle/>
           <a:p>
-            <a:pPr marL="0" indent="0">
+            <a:pPr marL="0" indent="0" algn="just">
               <a:buNone/>
             </a:pPr>
             <a:r>
-              <a:rPr lang="lt-LT" dirty="0"/>
-              <a:t>SAMPLE TEXT</a:t>
-            </a:r>
-            <a:endParaRPr lang="en-US" dirty="0"/>
+              <a:rPr lang="lt-LT" sz="2800" dirty="0"/>
+              <a:t>Robotas važiuoja tiesiai link tikslo pozicijos. Aptikęs kliūtį, ją apvažiuoja sukdamas į kairę ir važiuoja tol, kol priartėja prie tikslo linijos. Toliau vėl kartojamas algoritmas, kol pasiekiamas tikslas.</a:t>
+            </a:r>
+            <a:endParaRPr lang="en-US" sz="2800" dirty="0"/>
           </a:p>
         </p:txBody>
       </p:sp>

</xml_diff>